<commit_message>
update preparation for Essential
</commit_message>
<xml_diff>
--- a/Essential_EA/Practice on Essential Enterprise Architecture Tool.pptx
+++ b/Essential_EA/Practice on Essential Enterprise Architecture Tool.pptx
@@ -5,19 +5,20 @@
     <p:sldMasterId id="2147483648" r:id="rId1"/>
   </p:sldMasterIdLst>
   <p:notesMasterIdLst>
-    <p:notesMasterId r:id="rId4"/>
+    <p:notesMasterId r:id="rId5"/>
   </p:notesMasterIdLst>
   <p:handoutMasterIdLst>
-    <p:handoutMasterId r:id="rId5"/>
+    <p:handoutMasterId r:id="rId6"/>
   </p:handoutMasterIdLst>
   <p:sldIdLst>
     <p:sldId id="265" r:id="rId2"/>
     <p:sldId id="320" r:id="rId3"/>
+    <p:sldId id="321" r:id="rId4"/>
   </p:sldIdLst>
   <p:sldSz cx="12188825" cy="6858000"/>
   <p:notesSz cx="6858000" cy="9144000"/>
   <p:custDataLst>
-    <p:tags r:id="rId6"/>
+    <p:tags r:id="rId7"/>
   </p:custDataLst>
   <p:defaultTextStyle>
     <a:defPPr>
@@ -218,7 +219,7 @@
           <a:p>
             <a:fld id="{59088EAF-6ECA-4616-85EF-35AA19C641F3}" type="datetimeFigureOut">
               <a:rPr lang="en-US"/>
-              <a:t>1/2/2024</a:t>
+              <a:t>1/3/2024</a:t>
             </a:fld>
             <a:endParaRPr/>
           </a:p>
@@ -4227,6 +4228,208 @@
     <p:extLst>
       <p:ext uri="{BB962C8B-B14F-4D97-AF65-F5344CB8AC3E}">
         <p14:creationId xmlns:p14="http://schemas.microsoft.com/office/powerpoint/2010/main" val="2216462666"/>
+      </p:ext>
+    </p:extLst>
+  </p:cSld>
+  <p:clrMapOvr>
+    <a:masterClrMapping/>
+  </p:clrMapOvr>
+  <mc:AlternateContent xmlns:mc="http://schemas.openxmlformats.org/markup-compatibility/2006" xmlns:p14="http://schemas.microsoft.com/office/powerpoint/2010/main">
+    <mc:Choice Requires="p14">
+      <p:transition spd="med" p14:dur="700">
+        <p:fade/>
+      </p:transition>
+    </mc:Choice>
+    <mc:Fallback xmlns="">
+      <p:transition spd="med">
+        <p:fade/>
+      </p:transition>
+    </mc:Fallback>
+  </mc:AlternateContent>
+</p:sld>
+</file>
+
+<file path=ppt/slides/slide3.xml><?xml version="1.0" encoding="utf-8"?>
+<p:sld xmlns:a="http://schemas.openxmlformats.org/drawingml/2006/main" xmlns:r="http://schemas.openxmlformats.org/officeDocument/2006/relationships" xmlns:p="http://schemas.openxmlformats.org/presentationml/2006/main">
+  <p:cSld>
+    <p:spTree>
+      <p:nvGrpSpPr>
+        <p:cNvPr id="1" name=""/>
+        <p:cNvGrpSpPr/>
+        <p:nvPr/>
+      </p:nvGrpSpPr>
+      <p:grpSpPr>
+        <a:xfrm>
+          <a:off x="0" y="0"/>
+          <a:ext cx="0" cy="0"/>
+          <a:chOff x="0" y="0"/>
+          <a:chExt cx="0" cy="0"/>
+        </a:xfrm>
+      </p:grpSpPr>
+      <p:sp>
+        <p:nvSpPr>
+          <p:cNvPr id="5" name="Title 4">
+            <a:extLst>
+              <a:ext uri="{FF2B5EF4-FFF2-40B4-BE49-F238E27FC236}">
+                <a16:creationId xmlns:a16="http://schemas.microsoft.com/office/drawing/2014/main" id="{DF5E2C21-BD5B-5531-A5DC-4B02AEBFA3B2}"/>
+              </a:ext>
+            </a:extLst>
+          </p:cNvPr>
+          <p:cNvSpPr>
+            <a:spLocks noGrp="1"/>
+          </p:cNvSpPr>
+          <p:nvPr>
+            <p:ph type="ctrTitle"/>
+          </p:nvPr>
+        </p:nvSpPr>
+        <p:spPr/>
+        <p:txBody>
+          <a:bodyPr>
+            <a:normAutofit fontScale="90000"/>
+          </a:bodyPr>
+          <a:lstStyle/>
+          <a:p>
+            <a:r>
+              <a:rPr lang="en-US" dirty="0"/>
+              <a:t>Essential Open-Source Packages Download and Installation</a:t>
+            </a:r>
+          </a:p>
+        </p:txBody>
+      </p:sp>
+      <p:sp>
+        <p:nvSpPr>
+          <p:cNvPr id="6" name="Subtitle 5">
+            <a:extLst>
+              <a:ext uri="{FF2B5EF4-FFF2-40B4-BE49-F238E27FC236}">
+                <a16:creationId xmlns:a16="http://schemas.microsoft.com/office/drawing/2014/main" id="{B350C1A0-00B0-9ADD-1DCD-B3FB66BD32B4}"/>
+              </a:ext>
+            </a:extLst>
+          </p:cNvPr>
+          <p:cNvSpPr>
+            <a:spLocks noGrp="1"/>
+          </p:cNvSpPr>
+          <p:nvPr>
+            <p:ph type="subTitle" idx="1"/>
+          </p:nvPr>
+        </p:nvSpPr>
+        <p:spPr>
+          <a:xfrm>
+            <a:off x="1065213" y="4800600"/>
+            <a:ext cx="4669159" cy="1219200"/>
+          </a:xfrm>
+        </p:spPr>
+        <p:txBody>
+          <a:bodyPr>
+            <a:normAutofit fontScale="85000" lnSpcReduction="10000"/>
+          </a:bodyPr>
+          <a:lstStyle/>
+          <a:p>
+            <a:pPr>
+              <a:lnSpc>
+                <a:spcPct val="120000"/>
+              </a:lnSpc>
+            </a:pPr>
+            <a:r>
+              <a:rPr lang="en-US" dirty="0">
+                <a:hlinkClick r:id="rId2"/>
+              </a:rPr>
+              <a:t>https://enterprise-architecture.org/products/essential-open-source/essential-os-download/</a:t>
+            </a:r>
+            <a:endParaRPr lang="en-US" dirty="0"/>
+          </a:p>
+        </p:txBody>
+      </p:sp>
+      <p:sp>
+        <p:nvSpPr>
+          <p:cNvPr id="4" name="TextBox 3">
+            <a:extLst>
+              <a:ext uri="{FF2B5EF4-FFF2-40B4-BE49-F238E27FC236}">
+                <a16:creationId xmlns:a16="http://schemas.microsoft.com/office/drawing/2014/main" id="{9FC838CE-870E-50F7-BB55-400826529519}"/>
+              </a:ext>
+            </a:extLst>
+          </p:cNvPr>
+          <p:cNvSpPr txBox="1"/>
+          <p:nvPr/>
+        </p:nvSpPr>
+        <p:spPr>
+          <a:xfrm>
+            <a:off x="363721" y="484257"/>
+            <a:ext cx="1564852" cy="1015663"/>
+          </a:xfrm>
+          <a:prstGeom prst="rect">
+            <a:avLst/>
+          </a:prstGeom>
+          <a:noFill/>
+        </p:spPr>
+        <p:txBody>
+          <a:bodyPr wrap="none" rtlCol="0">
+            <a:spAutoFit/>
+          </a:bodyPr>
+          <a:lstStyle/>
+          <a:p>
+            <a:pPr algn="ctr"/>
+            <a:r>
+              <a:rPr lang="en-US" sz="6000" b="1" dirty="0">
+                <a:effectLst>
+                  <a:outerShdw blurRad="38100" dist="38100" dir="2700000" algn="tl">
+                    <a:srgbClr val="000000">
+                      <a:alpha val="43137"/>
+                    </a:srgbClr>
+                  </a:outerShdw>
+                </a:effectLst>
+                <a:latin typeface="ADLaM Display" panose="02010000000000000000" pitchFamily="2" charset="0"/>
+                <a:ea typeface="ADLaM Display" panose="02010000000000000000" pitchFamily="2" charset="0"/>
+                <a:cs typeface="ADLaM Display" panose="02010000000000000000" pitchFamily="2" charset="0"/>
+              </a:rPr>
+              <a:t>002</a:t>
+            </a:r>
+          </a:p>
+        </p:txBody>
+      </p:sp>
+      <p:pic>
+        <p:nvPicPr>
+          <p:cNvPr id="8" name="Picture 7">
+            <a:extLst>
+              <a:ext uri="{FF2B5EF4-FFF2-40B4-BE49-F238E27FC236}">
+                <a16:creationId xmlns:a16="http://schemas.microsoft.com/office/drawing/2014/main" id="{D138DEF7-2F80-F003-9893-AC3597113208}"/>
+              </a:ext>
+            </a:extLst>
+          </p:cNvPr>
+          <p:cNvPicPr>
+            <a:picLocks noChangeAspect="1"/>
+          </p:cNvPicPr>
+          <p:nvPr/>
+        </p:nvPicPr>
+        <p:blipFill>
+          <a:blip r:embed="rId3"/>
+          <a:stretch>
+            <a:fillRect/>
+          </a:stretch>
+        </p:blipFill>
+        <p:spPr>
+          <a:xfrm>
+            <a:off x="5878388" y="3901896"/>
+            <a:ext cx="5556321" cy="2302768"/>
+          </a:xfrm>
+          <a:prstGeom prst="rect">
+            <a:avLst/>
+          </a:prstGeom>
+          <a:ln>
+            <a:noFill/>
+          </a:ln>
+          <a:effectLst>
+            <a:outerShdw blurRad="292100" dist="139700" dir="2700000" algn="tl" rotWithShape="0">
+              <a:srgbClr val="333333">
+                <a:alpha val="65000"/>
+              </a:srgbClr>
+            </a:outerShdw>
+          </a:effectLst>
+        </p:spPr>
+      </p:pic>
+    </p:spTree>
+    <p:extLst>
+      <p:ext uri="{BB962C8B-B14F-4D97-AF65-F5344CB8AC3E}">
+        <p14:creationId xmlns:p14="http://schemas.microsoft.com/office/powerpoint/2010/main" val="463351251"/>
       </p:ext>
     </p:extLst>
   </p:cSld>

</xml_diff>